<commit_message>
Poster About WAFF section
</commit_message>
<xml_diff>
--- a/Assets/Senior Project Documents/Poster Templates/Chosen One.pptx
+++ b/Assets/Senior Project Documents/Poster Templates/Chosen One.pptx
@@ -209,7 +209,7 @@
             <a:fld id="{5260755F-66BB-924E-BB7B-E983D5FDE998}" type="datetimeFigureOut">
               <a:rPr lang="en-US" smtClean="0"/>
               <a:pPr/>
-              <a:t>11/19/2015</a:t>
+              <a:t>11/22/2015</a:t>
             </a:fld>
             <a:endParaRPr lang="en-US"/>
           </a:p>
@@ -899,7 +899,7 @@
           <p:nvPr/>
         </p:nvPicPr>
         <mc:AlternateContent xmlns:mc="http://schemas.openxmlformats.org/markup-compatibility/2006">
-          <mc:Choice xmlns:ma="http://schemas.microsoft.com/office/mac/drawingml/2008/main" xmlns:mv="urn:schemas-microsoft-com:mac:vml" xmlns="" Requires="ma">
+          <mc:Choice xmlns="" xmlns:mv="urn:schemas-microsoft-com:mac:vml" xmlns:ma="http://schemas.microsoft.com/office/mac/drawingml/2008/main" Requires="ma">
             <p:blipFill>
               <a:blip r:embed="rId4"/>
               <a:stretch>
@@ -1337,8 +1337,8 @@
         </p:nvSpPr>
         <p:spPr>
           <a:xfrm>
-            <a:off x="523914" y="5272465"/>
-            <a:ext cx="10196513" cy="754045"/>
+            <a:off x="523914" y="4987772"/>
+            <a:ext cx="10196513" cy="1323431"/>
           </a:xfrm>
           <a:prstGeom prst="rect">
             <a:avLst/>
@@ -1509,14 +1509,22 @@
           </a:lstStyle>
           <a:p>
             <a:r>
-              <a:rPr lang="en-US" spc="1000" dirty="0" smtClean="0">
+              <a:rPr lang="en-US" spc="1200" dirty="0">
                 <a:solidFill>
                   <a:schemeClr val="bg1"/>
                 </a:solidFill>
               </a:rPr>
-              <a:t>INTRODUCTION</a:t>
+              <a:t>ABOUT WORLD ART FILM </a:t>
             </a:r>
-            <a:endParaRPr lang="en-US" spc="1000" dirty="0">
+            <a:r>
+              <a:rPr lang="en-US" spc="1200" dirty="0" smtClean="0">
+                <a:solidFill>
+                  <a:schemeClr val="bg1"/>
+                </a:solidFill>
+              </a:rPr>
+              <a:t>FESTIVAL</a:t>
+            </a:r>
+            <a:endParaRPr lang="en-US" spc="1200" dirty="0">
               <a:solidFill>
                 <a:schemeClr val="bg1"/>
               </a:solidFill>
@@ -1711,7 +1719,7 @@
                   <a:schemeClr val="bg1"/>
                 </a:solidFill>
               </a:rPr>
-              <a:t>ABOUT WORLD </a:t>
+              <a:t>ABOUT WORLD ART FILM </a:t>
             </a:r>
             <a:r>
               <a:rPr lang="en-US" spc="1200" dirty="0" smtClean="0">
@@ -1719,7 +1727,7 @@
                   <a:schemeClr val="bg1"/>
                 </a:solidFill>
               </a:rPr>
-              <a:t>ART FILM FESTIVAL</a:t>
+              <a:t>FESTVAL</a:t>
             </a:r>
             <a:endParaRPr lang="en-US" spc="1200" dirty="0">
               <a:solidFill>
@@ -2763,13 +2771,6 @@
               </a:rPr>
               <a:t> </a:t>
             </a:r>
-            <a:endParaRPr lang="en-US" sz="1800" b="0" i="1" baseline="0" dirty="0" smtClean="0">
-              <a:solidFill>
-                <a:srgbClr val="000000"/>
-              </a:solidFill>
-              <a:latin typeface="Arial" pitchFamily="34" charset="0"/>
-              <a:cs typeface="Arial" pitchFamily="34" charset="0"/>
-            </a:endParaRPr>
           </a:p>
         </p:txBody>
       </p:sp>
@@ -2803,6 +2804,143 @@
           </a:prstGeom>
         </p:spPr>
       </p:pic>
+      <p:sp>
+        <p:nvSpPr>
+          <p:cNvPr id="2" name="TextBox 1"/>
+          <p:cNvSpPr txBox="1"/>
+          <p:nvPr/>
+        </p:nvSpPr>
+        <p:spPr>
+          <a:xfrm>
+            <a:off x="523914" y="6444343"/>
+            <a:ext cx="10196513" cy="6247864"/>
+          </a:xfrm>
+          <a:prstGeom prst="rect">
+            <a:avLst/>
+          </a:prstGeom>
+          <a:noFill/>
+        </p:spPr>
+        <p:txBody>
+          <a:bodyPr wrap="square" rtlCol="0">
+            <a:spAutoFit/>
+          </a:bodyPr>
+          <a:lstStyle/>
+          <a:p>
+            <a:pPr lvl="0"/>
+            <a:r>
+              <a:rPr lang="en-US" sz="4000" dirty="0" smtClean="0">
+                <a:solidFill>
+                  <a:schemeClr val="dk1"/>
+                </a:solidFill>
+                <a:latin typeface="Libre Baskerville"/>
+                <a:ea typeface="Libre Baskerville"/>
+                <a:cs typeface="Libre Baskerville"/>
+                <a:sym typeface="Libre Baskerville"/>
+              </a:rPr>
+              <a:t>Next year 5,000 </a:t>
+            </a:r>
+            <a:r>
+              <a:rPr lang="en-US" sz="4000" dirty="0">
+                <a:solidFill>
+                  <a:schemeClr val="dk1"/>
+                </a:solidFill>
+                <a:latin typeface="Libre Baskerville"/>
+                <a:ea typeface="Libre Baskerville"/>
+                <a:cs typeface="Libre Baskerville"/>
+                <a:sym typeface="Libre Baskerville"/>
+              </a:rPr>
+              <a:t>attendees are expected to benefit from participating in the World Arts Film Festival </a:t>
+            </a:r>
+            <a:r>
+              <a:rPr lang="en-US" sz="4000" dirty="0" smtClean="0">
+                <a:solidFill>
+                  <a:schemeClr val="dk1"/>
+                </a:solidFill>
+                <a:latin typeface="Libre Baskerville"/>
+                <a:ea typeface="Libre Baskerville"/>
+                <a:cs typeface="Libre Baskerville"/>
+                <a:sym typeface="Libre Baskerville"/>
+              </a:rPr>
+              <a:t>including </a:t>
+            </a:r>
+            <a:r>
+              <a:rPr lang="en-US" sz="4000" dirty="0">
+                <a:solidFill>
+                  <a:schemeClr val="dk1"/>
+                </a:solidFill>
+                <a:latin typeface="Libre Baskerville"/>
+                <a:ea typeface="Libre Baskerville"/>
+                <a:cs typeface="Libre Baskerville"/>
+                <a:sym typeface="Libre Baskerville"/>
+              </a:rPr>
+              <a:t>college-aged students, local and visiting filmmakers from over 30+ countries, men and women </a:t>
+            </a:r>
+            <a:r>
+              <a:rPr lang="en-US" sz="4000" dirty="0" smtClean="0">
+                <a:solidFill>
+                  <a:schemeClr val="dk1"/>
+                </a:solidFill>
+                <a:latin typeface="Libre Baskerville"/>
+                <a:ea typeface="Libre Baskerville"/>
+                <a:cs typeface="Libre Baskerville"/>
+                <a:sym typeface="Libre Baskerville"/>
+              </a:rPr>
+              <a:t>from </a:t>
+            </a:r>
+            <a:r>
+              <a:rPr lang="en-US" sz="4000" dirty="0">
+                <a:solidFill>
+                  <a:schemeClr val="dk1"/>
+                </a:solidFill>
+                <a:latin typeface="Libre Baskerville"/>
+                <a:ea typeface="Libre Baskerville"/>
+                <a:cs typeface="Libre Baskerville"/>
+                <a:sym typeface="Libre Baskerville"/>
+              </a:rPr>
+              <a:t>Jacksonville area, New York and California, groups, families </a:t>
+            </a:r>
+            <a:r>
+              <a:rPr lang="en-US" sz="4000">
+                <a:solidFill>
+                  <a:schemeClr val="dk1"/>
+                </a:solidFill>
+                <a:latin typeface="Libre Baskerville"/>
+                <a:ea typeface="Libre Baskerville"/>
+                <a:cs typeface="Libre Baskerville"/>
+                <a:sym typeface="Libre Baskerville"/>
+              </a:rPr>
+              <a:t>and </a:t>
+            </a:r>
+            <a:r>
+              <a:rPr lang="en-US" sz="4000" smtClean="0">
+                <a:solidFill>
+                  <a:schemeClr val="dk1"/>
+                </a:solidFill>
+                <a:latin typeface="Libre Baskerville"/>
+                <a:ea typeface="Libre Baskerville"/>
+                <a:cs typeface="Libre Baskerville"/>
+                <a:sym typeface="Libre Baskerville"/>
+              </a:rPr>
+              <a:t>individuals </a:t>
+            </a:r>
+            <a:r>
+              <a:rPr lang="en-US" sz="4000" dirty="0">
+                <a:solidFill>
+                  <a:schemeClr val="dk1"/>
+                </a:solidFill>
+                <a:latin typeface="Libre Baskerville"/>
+                <a:ea typeface="Libre Baskerville"/>
+                <a:cs typeface="Libre Baskerville"/>
+                <a:sym typeface="Libre Baskerville"/>
+              </a:rPr>
+              <a:t>including those with special needs interested in the unique film festival experience.</a:t>
+            </a:r>
+          </a:p>
+          <a:p>
+            <a:endParaRPr lang="en-US" sz="4000" dirty="0"/>
+          </a:p>
+        </p:txBody>
+      </p:sp>
     </p:spTree>
   </p:cSld>
   <p:clrMapOvr>

</xml_diff>

<commit_message>
User Stories section added
</commit_message>
<xml_diff>
--- a/Assets/Senior Project Documents/Poster Templates/Chosen One.pptx
+++ b/Assets/Senior Project Documents/Poster Templates/Chosen One.pptx
@@ -109,7 +109,7 @@
   </p:defaultTextStyle>
   <p:extLst>
     <p:ext uri="{EFAFB233-063F-42B5-8137-9DF3F51BA10A}">
-      <p15:sldGuideLst xmlns="" xmlns:p15="http://schemas.microsoft.com/office/powerpoint/2012/main">
+      <p15:sldGuideLst xmlns:p15="http://schemas.microsoft.com/office/powerpoint/2012/main">
         <p15:guide id="1" orient="horz" pos="3035">
           <p15:clr>
             <a:srgbClr val="A4A3A4"/>
@@ -899,7 +899,7 @@
           <p:nvPr/>
         </p:nvPicPr>
         <mc:AlternateContent xmlns:mc="http://schemas.openxmlformats.org/markup-compatibility/2006">
-          <mc:Choice xmlns="" xmlns:mv="urn:schemas-microsoft-com:mac:vml" xmlns:ma="http://schemas.microsoft.com/office/mac/drawingml/2008/main" Requires="ma">
+          <mc:Choice xmlns:ma="http://schemas.microsoft.com/office/mac/drawingml/2008/main" xmlns:mv="urn:schemas-microsoft-com:mac:vml" xmlns="" Requires="ma">
             <p:blipFill>
               <a:blip r:embed="rId4"/>
               <a:stretch>
@@ -1454,6 +1454,14 @@
               <a:buFont typeface="Arial" pitchFamily="34" charset="0"/>
               <a:buNone/>
             </a:pPr>
+            <a:r>
+              <a:rPr lang="en-US" sz="3700" b="1" spc="1200" dirty="0" smtClean="0">
+                <a:solidFill>
+                  <a:schemeClr val="bg1"/>
+                </a:solidFill>
+              </a:rPr>
+              <a:t>USER STORIES</a:t>
+            </a:r>
             <a:endParaRPr lang="en-US" sz="3700" b="1" spc="1200" dirty="0">
               <a:solidFill>
                 <a:schemeClr val="bg1"/>
@@ -2511,6 +2519,36 @@
               </a14:hiddenFill>
             </a:ext>
           </a:extLst>
+        </p:spPr>
+      </p:pic>
+      <p:pic>
+        <p:nvPicPr>
+          <p:cNvPr id="9" name="Picture 8"/>
+          <p:cNvPicPr>
+            <a:picLocks noChangeAspect="1"/>
+          </p:cNvPicPr>
+          <p:nvPr/>
+        </p:nvPicPr>
+        <p:blipFill>
+          <a:blip r:embed="rId17">
+            <a:extLst>
+              <a:ext uri="{28A0092B-C50C-407E-A947-70E740481C1C}">
+                <a14:useLocalDpi xmlns:a14="http://schemas.microsoft.com/office/drawing/2010/main" val="0"/>
+              </a:ext>
+            </a:extLst>
+          </a:blip>
+          <a:stretch>
+            <a:fillRect/>
+          </a:stretch>
+        </p:blipFill>
+        <p:spPr>
+          <a:xfrm>
+            <a:off x="514391" y="18134038"/>
+            <a:ext cx="10196512" cy="10038499"/>
+          </a:xfrm>
+          <a:prstGeom prst="rect">
+            <a:avLst/>
+          </a:prstGeom>
         </p:spPr>
       </p:pic>
     </p:spTree>

</xml_diff>

<commit_message>
Fixed the user stories picture. Grammatical errors, Actor errors, and not all user stories were in user story format.
</commit_message>
<xml_diff>
--- a/Assets/Senior Project Documents/Poster Templates/Chosen One.pptx
+++ b/Assets/Senior Project Documents/Poster Templates/Chosen One.pptx
@@ -109,7 +109,7 @@
   </p:defaultTextStyle>
   <p:extLst>
     <p:ext uri="{EFAFB233-063F-42B5-8137-9DF3F51BA10A}">
-      <p15:sldGuideLst xmlns:p15="http://schemas.microsoft.com/office/powerpoint/2012/main">
+      <p15:sldGuideLst xmlns:p15="http://schemas.microsoft.com/office/powerpoint/2012/main" xmlns="">
         <p15:guide id="1" orient="horz" pos="3035">
           <p15:clr>
             <a:srgbClr val="A4A3A4"/>
@@ -209,7 +209,7 @@
             <a:fld id="{5260755F-66BB-924E-BB7B-E983D5FDE998}" type="datetimeFigureOut">
               <a:rPr lang="en-US" smtClean="0"/>
               <a:pPr/>
-              <a:t>11/22/2015</a:t>
+              <a:t>11/23/2015</a:t>
             </a:fld>
             <a:endParaRPr lang="en-US"/>
           </a:p>
@@ -899,7 +899,7 @@
           <p:nvPr/>
         </p:nvPicPr>
         <mc:AlternateContent xmlns:mc="http://schemas.openxmlformats.org/markup-compatibility/2006">
-          <mc:Choice xmlns:ma="http://schemas.microsoft.com/office/mac/drawingml/2008/main" xmlns:mv="urn:schemas-microsoft-com:mac:vml" xmlns="" Requires="ma">
+          <mc:Choice xmlns="" xmlns:mv="urn:schemas-microsoft-com:mac:vml" xmlns:ma="http://schemas.microsoft.com/office/mac/drawingml/2008/main" Requires="ma">
             <p:blipFill>
               <a:blip r:embed="rId4"/>
               <a:stretch>
@@ -1412,7 +1412,7 @@
         </p:nvSpPr>
         <p:spPr>
           <a:xfrm>
-            <a:off x="500103" y="16580155"/>
+            <a:off x="500103" y="17073019"/>
             <a:ext cx="10210799" cy="754045"/>
           </a:xfrm>
           <a:prstGeom prst="rect">
@@ -1941,12 +1941,17 @@
         </p:blipFill>
         <p:spPr>
           <a:xfrm>
-            <a:off x="549373" y="11886174"/>
-            <a:ext cx="10171054" cy="4352454"/>
+            <a:off x="726297" y="12107884"/>
+            <a:ext cx="9758409" cy="4352454"/>
           </a:xfrm>
           <a:prstGeom prst="rect">
             <a:avLst/>
           </a:prstGeom>
+          <a:ln w="38100">
+            <a:solidFill>
+              <a:schemeClr val="tx1"/>
+            </a:solidFill>
+          </a:ln>
         </p:spPr>
       </p:pic>
       <p:sp>
@@ -2425,13 +2430,18 @@
         </p:blipFill>
         <p:spPr bwMode="auto">
           <a:xfrm>
-            <a:off x="34664879" y="10930760"/>
-            <a:ext cx="7235433" cy="5307868"/>
+            <a:off x="34664879" y="11886174"/>
+            <a:ext cx="7235433" cy="4352454"/>
           </a:xfrm>
           <a:prstGeom prst="rect">
             <a:avLst/>
           </a:prstGeom>
           <a:noFill/>
+          <a:ln w="38100">
+            <a:solidFill>
+              <a:schemeClr val="tx1"/>
+            </a:solidFill>
+          </a:ln>
           <a:extLst>
             <a:ext uri="{909E8E84-426E-40DD-AFC4-6F175D3DCCD1}">
               <a14:hiddenFill xmlns:a14="http://schemas.microsoft.com/office/drawing/2010/main">
@@ -2523,9 +2533,9 @@
       </p:pic>
       <p:pic>
         <p:nvPicPr>
-          <p:cNvPr id="9" name="Picture 8"/>
+          <p:cNvPr id="15" name="Picture 2" descr="Machine generated alternative text:&#10;As a Voter would be able to &#10;submit my votes for different films &#10;As an Admin, I want to be able to &#10;create a new event &#10;As an Admin, want to be able to enter &#10;film details into the database &#10;As a Mobile Voter, I want &#10;access to a list of films that &#10;As a Voter want to be able to see all blocks &#10;that are available before &#10;Voter &#10;ADMIN &#10;Mobile Voter &#10;leader board of the voting &#10;As an admin, want to view the leader boards &#10;so can display them for the Voters to see and &#10;As a Mobile Voter, I want to be able &#10;to download the mobile app as &#10;quickly as possib18 &#10;As a Mobile Voter, want to be able to use the mobile app on "/>
           <p:cNvPicPr>
-            <a:picLocks noChangeAspect="1"/>
+            <a:picLocks noChangeAspect="1" noChangeArrowheads="1"/>
           </p:cNvPicPr>
           <p:nvPr/>
         </p:nvPicPr>
@@ -2537,18 +2547,29 @@
               </a:ext>
             </a:extLst>
           </a:blip>
+          <a:srcRect/>
           <a:stretch>
             <a:fillRect/>
           </a:stretch>
         </p:blipFill>
-        <p:spPr>
+        <p:spPr bwMode="auto">
           <a:xfrm>
-            <a:off x="514391" y="18134038"/>
-            <a:ext cx="10196512" cy="10038499"/>
+            <a:off x="152400" y="22364700"/>
+            <a:ext cx="10558502" cy="7356340"/>
           </a:xfrm>
           <a:prstGeom prst="rect">
             <a:avLst/>
           </a:prstGeom>
+          <a:noFill/>
+          <a:extLst>
+            <a:ext uri="{909E8E84-426E-40DD-AFC4-6F175D3DCCD1}">
+              <a14:hiddenFill xmlns:a14="http://schemas.microsoft.com/office/drawing/2010/main">
+                <a:solidFill>
+                  <a:srgbClr val="FFFFFF"/>
+                </a:solidFill>
+              </a14:hiddenFill>
+            </a:ext>
+          </a:extLst>
         </p:spPr>
       </p:pic>
     </p:spTree>

</xml_diff>

<commit_message>
Added some text to go along with the image of our user stories
</commit_message>
<xml_diff>
--- a/Assets/Senior Project Documents/Poster Templates/Chosen One.pptx
+++ b/Assets/Senior Project Documents/Poster Templates/Chosen One.pptx
@@ -109,7 +109,7 @@
   </p:defaultTextStyle>
   <p:extLst>
     <p:ext uri="{EFAFB233-063F-42B5-8137-9DF3F51BA10A}">
-      <p15:sldGuideLst xmlns:p15="http://schemas.microsoft.com/office/powerpoint/2012/main" xmlns="">
+      <p15:sldGuideLst xmlns="" xmlns:p15="http://schemas.microsoft.com/office/powerpoint/2012/main">
         <p15:guide id="1" orient="horz" pos="3035">
           <p15:clr>
             <a:srgbClr val="A4A3A4"/>
@@ -899,7 +899,7 @@
           <p:nvPr/>
         </p:nvPicPr>
         <mc:AlternateContent xmlns:mc="http://schemas.openxmlformats.org/markup-compatibility/2006">
-          <mc:Choice xmlns="" xmlns:mv="urn:schemas-microsoft-com:mac:vml" xmlns:ma="http://schemas.microsoft.com/office/mac/drawingml/2008/main" Requires="ma">
+          <mc:Choice xmlns:ma="http://schemas.microsoft.com/office/mac/drawingml/2008/main" xmlns:mv="urn:schemas-microsoft-com:mac:vml" xmlns="" Requires="ma">
             <p:blipFill>
               <a:blip r:embed="rId4"/>
               <a:stretch>
@@ -2554,8 +2554,8 @@
         </p:blipFill>
         <p:spPr bwMode="auto">
           <a:xfrm>
-            <a:off x="152400" y="22364700"/>
-            <a:ext cx="10558502" cy="7356340"/>
+            <a:off x="173851" y="22168902"/>
+            <a:ext cx="10537051" cy="7866360"/>
           </a:xfrm>
           <a:prstGeom prst="rect">
             <a:avLst/>
@@ -2572,6 +2572,36 @@
           </a:extLst>
         </p:spPr>
       </p:pic>
+      <p:sp>
+        <p:nvSpPr>
+          <p:cNvPr id="9" name="TextBox 8"/>
+          <p:cNvSpPr txBox="1"/>
+          <p:nvPr/>
+        </p:nvSpPr>
+        <p:spPr>
+          <a:xfrm>
+            <a:off x="500103" y="18383250"/>
+            <a:ext cx="10210799" cy="3785652"/>
+          </a:xfrm>
+          <a:prstGeom prst="rect">
+            <a:avLst/>
+          </a:prstGeom>
+          <a:noFill/>
+        </p:spPr>
+        <p:txBody>
+          <a:bodyPr wrap="square" rtlCol="0">
+            <a:spAutoFit/>
+          </a:bodyPr>
+          <a:lstStyle/>
+          <a:p>
+            <a:r>
+              <a:rPr lang="en-US" sz="4000" dirty="0" smtClean="0"/>
+              <a:t>In our e-Voting System we have accumulated roughly  40 different use r stories so far. All of these user stories revolves around 3 actors; Voter, Admin, Mobile Voter.  Below is a snippet of just a couple of the user stories we came up with.</a:t>
+            </a:r>
+            <a:endParaRPr lang="en-US" sz="4000" dirty="0"/>
+          </a:p>
+        </p:txBody>
+      </p:sp>
     </p:spTree>
   </p:cSld>
   <p:clrMapOvr>

</xml_diff>

<commit_message>
added a couple of diagrams to the poster
</commit_message>
<xml_diff>
--- a/Assets/Senior Project Documents/Poster Templates/Chosen One.pptx
+++ b/Assets/Senior Project Documents/Poster Templates/Chosen One.pptx
@@ -109,7 +109,7 @@
   </p:defaultTextStyle>
   <p:extLst>
     <p:ext uri="{EFAFB233-063F-42B5-8137-9DF3F51BA10A}">
-      <p15:sldGuideLst xmlns="" xmlns:p15="http://schemas.microsoft.com/office/powerpoint/2012/main">
+      <p15:sldGuideLst xmlns:p15="http://schemas.microsoft.com/office/powerpoint/2012/main">
         <p15:guide id="1" orient="horz" pos="3035">
           <p15:clr>
             <a:srgbClr val="A4A3A4"/>
@@ -899,7 +899,7 @@
           <p:nvPr/>
         </p:nvPicPr>
         <mc:AlternateContent xmlns:mc="http://schemas.openxmlformats.org/markup-compatibility/2006">
-          <mc:Choice xmlns:ma="http://schemas.microsoft.com/office/mac/drawingml/2008/main" xmlns:mv="urn:schemas-microsoft-com:mac:vml" xmlns="" Requires="ma">
+          <mc:Choice xmlns="" xmlns:mv="urn:schemas-microsoft-com:mac:vml" xmlns:ma="http://schemas.microsoft.com/office/mac/drawingml/2008/main" Requires="ma">
             <p:blipFill>
               <a:blip r:embed="rId4"/>
               <a:stretch>
@@ -2430,7 +2430,7 @@
         </p:blipFill>
         <p:spPr bwMode="auto">
           <a:xfrm>
-            <a:off x="34664879" y="11886174"/>
+            <a:off x="34664879" y="17515526"/>
             <a:ext cx="7235433" cy="4352454"/>
           </a:xfrm>
           <a:prstGeom prst="rect">
@@ -2602,11 +2602,241 @@
           </a:p>
         </p:txBody>
       </p:sp>
+      <p:pic>
+        <p:nvPicPr>
+          <p:cNvPr id="19" name="Picture 4" descr="Voter Diagram"/>
+          <p:cNvPicPr>
+            <a:picLocks noChangeAspect="1" noChangeArrowheads="1"/>
+          </p:cNvPicPr>
+          <p:nvPr/>
+        </p:nvPicPr>
+        <p:blipFill>
+          <a:blip r:embed="rId18">
+            <a:extLst>
+              <a:ext uri="{28A0092B-C50C-407E-A947-70E740481C1C}">
+                <a14:useLocalDpi xmlns:a14="http://schemas.microsoft.com/office/drawing/2010/main" val="0"/>
+              </a:ext>
+            </a:extLst>
+          </a:blip>
+          <a:srcRect/>
+          <a:stretch>
+            <a:fillRect/>
+          </a:stretch>
+        </p:blipFill>
+        <p:spPr bwMode="auto">
+          <a:xfrm>
+            <a:off x="11640952" y="7897865"/>
+            <a:ext cx="3181350" cy="2219325"/>
+          </a:xfrm>
+          <a:prstGeom prst="rect">
+            <a:avLst/>
+          </a:prstGeom>
+          <a:noFill/>
+          <a:ln>
+            <a:noFill/>
+          </a:ln>
+          <a:extLst>
+            <a:ext uri="{909E8E84-426E-40DD-AFC4-6F175D3DCCD1}">
+              <a14:hiddenFill xmlns:a14="http://schemas.microsoft.com/office/drawing/2010/main">
+                <a:solidFill>
+                  <a:srgbClr val="FFFFFF"/>
+                </a:solidFill>
+              </a14:hiddenFill>
+            </a:ext>
+            <a:ext uri="{91240B29-F687-4F45-9708-019B960494DF}">
+              <a14:hiddenLine xmlns:a14="http://schemas.microsoft.com/office/drawing/2010/main" w="9525">
+                <a:solidFill>
+                  <a:srgbClr val="000000"/>
+                </a:solidFill>
+                <a:miter lim="800000"/>
+                <a:headEnd/>
+                <a:tailEnd/>
+              </a14:hiddenLine>
+            </a:ext>
+          </a:extLst>
+        </p:spPr>
+      </p:pic>
+      <p:graphicFrame>
+        <p:nvGraphicFramePr>
+          <p:cNvPr id="20" name="Object 19"/>
+          <p:cNvGraphicFramePr>
+            <a:graphicFrameLocks noChangeAspect="1"/>
+          </p:cNvGraphicFramePr>
+          <p:nvPr>
+            <p:extLst>
+              <p:ext uri="{D42A27DB-BD31-4B8C-83A1-F6EECF244321}">
+                <p14:modId xmlns:p14="http://schemas.microsoft.com/office/powerpoint/2010/main" val="3701045237"/>
+              </p:ext>
+            </p:extLst>
+          </p:nvPr>
+        </p:nvGraphicFramePr>
+        <p:xfrm>
+          <a:off x="14374430" y="5809079"/>
+          <a:ext cx="5937250" cy="1992313"/>
+        </p:xfrm>
+        <a:graphic>
+          <a:graphicData uri="http://schemas.openxmlformats.org/presentationml/2006/ole">
+            <mc:AlternateContent xmlns:mc="http://schemas.openxmlformats.org/markup-compatibility/2006">
+              <mc:Choice xmlns:v="urn:schemas-microsoft-com:vml" Requires="v">
+                <p:oleObj spid="_x0000_s1037" name="Visio" r:id="rId19" imgW="7181852" imgH="2409868" progId="Visio.Drawing.15">
+                  <p:embed/>
+                </p:oleObj>
+              </mc:Choice>
+              <mc:Fallback>
+                <p:oleObj name="Visio" r:id="rId19" imgW="7181852" imgH="2409868" progId="Visio.Drawing.15">
+                  <p:embed/>
+                  <p:pic>
+                    <p:nvPicPr>
+                      <p:cNvPr id="0" name="Object 5"/>
+                      <p:cNvPicPr>
+                        <a:picLocks noChangeAspect="1" noChangeArrowheads="1"/>
+                      </p:cNvPicPr>
+                      <p:nvPr/>
+                    </p:nvPicPr>
+                    <p:blipFill>
+                      <a:blip r:embed="rId20">
+                        <a:extLst>
+                          <a:ext uri="{28A0092B-C50C-407E-A947-70E740481C1C}">
+                            <a14:useLocalDpi xmlns:a14="http://schemas.microsoft.com/office/drawing/2010/main" val="0"/>
+                          </a:ext>
+                        </a:extLst>
+                      </a:blip>
+                      <a:srcRect/>
+                      <a:stretch>
+                        <a:fillRect/>
+                      </a:stretch>
+                    </p:blipFill>
+                    <p:spPr bwMode="auto">
+                      <a:xfrm>
+                        <a:off x="14374430" y="5809079"/>
+                        <a:ext cx="5937250" cy="1992313"/>
+                      </a:xfrm>
+                      <a:prstGeom prst="rect">
+                        <a:avLst/>
+                      </a:prstGeom>
+                      <a:noFill/>
+                      <a:ln>
+                        <a:noFill/>
+                      </a:ln>
+                      <a:extLst>
+                        <a:ext uri="{909E8E84-426E-40DD-AFC4-6F175D3DCCD1}">
+                          <a14:hiddenFill xmlns:a14="http://schemas.microsoft.com/office/drawing/2010/main">
+                            <a:solidFill>
+                              <a:srgbClr val="FFFFFF"/>
+                            </a:solidFill>
+                          </a14:hiddenFill>
+                        </a:ext>
+                        <a:ext uri="{91240B29-F687-4F45-9708-019B960494DF}">
+                          <a14:hiddenLine xmlns:a14="http://schemas.microsoft.com/office/drawing/2010/main" w="9525">
+                            <a:solidFill>
+                              <a:srgbClr val="000000"/>
+                            </a:solidFill>
+                            <a:miter lim="800000"/>
+                            <a:headEnd/>
+                            <a:tailEnd/>
+                          </a14:hiddenLine>
+                        </a:ext>
+                      </a:extLst>
+                    </p:spPr>
+                  </p:pic>
+                </p:oleObj>
+              </mc:Fallback>
+            </mc:AlternateContent>
+          </a:graphicData>
+        </a:graphic>
+      </p:graphicFrame>
+      <p:pic>
+        <p:nvPicPr>
+          <p:cNvPr id="32" name="image01.png"/>
+          <p:cNvPicPr/>
+          <p:nvPr/>
+        </p:nvPicPr>
+        <p:blipFill>
+          <a:blip r:embed="rId21"/>
+          <a:srcRect/>
+          <a:stretch>
+            <a:fillRect/>
+          </a:stretch>
+        </p:blipFill>
+        <p:spPr>
+          <a:xfrm>
+            <a:off x="14822302" y="10126684"/>
+            <a:ext cx="2286000" cy="1981200"/>
+          </a:xfrm>
+          <a:prstGeom prst="rect">
+            <a:avLst/>
+          </a:prstGeom>
+          <a:ln/>
+        </p:spPr>
+      </p:pic>
+      <p:pic>
+        <p:nvPicPr>
+          <p:cNvPr id="33" name="Picture 1"/>
+          <p:cNvPicPr>
+            <a:picLocks noChangeAspect="1" noChangeArrowheads="1"/>
+          </p:cNvPicPr>
+          <p:nvPr/>
+        </p:nvPicPr>
+        <p:blipFill>
+          <a:blip r:embed="rId22"/>
+          <a:srcRect/>
+          <a:stretch>
+            <a:fillRect/>
+          </a:stretch>
+        </p:blipFill>
+        <p:spPr bwMode="auto">
+          <a:xfrm>
+            <a:off x="17248548" y="7893370"/>
+            <a:ext cx="3039856" cy="1914525"/>
+          </a:xfrm>
+          <a:prstGeom prst="rect">
+            <a:avLst/>
+          </a:prstGeom>
+          <a:noFill/>
+          <a:ln w="9525">
+            <a:noFill/>
+            <a:miter lim="800000"/>
+            <a:headEnd/>
+            <a:tailEnd/>
+          </a:ln>
+        </p:spPr>
+      </p:pic>
+      <p:pic>
+        <p:nvPicPr>
+          <p:cNvPr id="28" name="Picture 27"/>
+          <p:cNvPicPr>
+            <a:picLocks noChangeAspect="1"/>
+          </p:cNvPicPr>
+          <p:nvPr/>
+        </p:nvPicPr>
+        <p:blipFill>
+          <a:blip r:embed="rId23"/>
+          <a:stretch>
+            <a:fillRect/>
+          </a:stretch>
+        </p:blipFill>
+        <p:spPr>
+          <a:xfrm>
+            <a:off x="11516573" y="16932863"/>
+            <a:ext cx="8771831" cy="5663518"/>
+          </a:xfrm>
+          <a:prstGeom prst="rect">
+            <a:avLst/>
+          </a:prstGeom>
+        </p:spPr>
+      </p:pic>
     </p:spTree>
   </p:cSld>
   <p:clrMapOvr>
     <a:masterClrMapping/>
   </p:clrMapOvr>
+  <p:timing>
+    <p:tnLst>
+      <p:par>
+        <p:cTn id="1" dur="indefinite" restart="never" nodeType="tmRoot"/>
+      </p:par>
+    </p:tnLst>
+  </p:timing>
 </p:sld>
 </file>
 

</xml_diff>

<commit_message>
add commentary to summary & future
</commit_message>
<xml_diff>
--- a/Assets/Senior Project Documents/Poster Templates/Chosen One.pptx
+++ b/Assets/Senior Project Documents/Poster Templates/Chosen One.pptx
@@ -209,7 +209,7 @@
             <a:fld id="{5260755F-66BB-924E-BB7B-E983D5FDE998}" type="datetimeFigureOut">
               <a:rPr lang="en-US" smtClean="0"/>
               <a:pPr/>
-              <a:t>11/23/2015</a:t>
+              <a:t>11/24/2015</a:t>
             </a:fld>
             <a:endParaRPr lang="en-US"/>
           </a:p>
@@ -899,7 +899,7 @@
           <p:nvPr/>
         </p:nvPicPr>
         <mc:AlternateContent xmlns:mc="http://schemas.openxmlformats.org/markup-compatibility/2006">
-          <mc:Choice xmlns="" xmlns:mv="urn:schemas-microsoft-com:mac:vml" xmlns:ma="http://schemas.microsoft.com/office/mac/drawingml/2008/main" Requires="ma">
+          <mc:Choice xmlns:ma="http://schemas.microsoft.com/office/mac/drawingml/2008/main" xmlns:mv="urn:schemas-microsoft-com:mac:vml" xmlns="" Requires="ma">
             <p:blipFill>
               <a:blip r:embed="rId4"/>
               <a:stretch>
@@ -1095,7 +1095,31 @@
                 <a:latin typeface="Times New Roman"/>
                 <a:cs typeface="Times New Roman"/>
               </a:rPr>
-              <a:t>World Film Festival e-Voting System</a:t>
+              <a:t>World </a:t>
+            </a:r>
+            <a:r>
+              <a:rPr lang="en-US" sz="13800" b="0" spc="-300" baseline="0" dirty="0" smtClean="0">
+                <a:solidFill>
+                  <a:schemeClr val="accent3">
+                    <a:lumMod val="50000"/>
+                  </a:schemeClr>
+                </a:solidFill>
+                <a:latin typeface="Times New Roman"/>
+                <a:cs typeface="Times New Roman"/>
+              </a:rPr>
+              <a:t>Arts Film </a:t>
+            </a:r>
+            <a:r>
+              <a:rPr lang="en-US" sz="13800" b="0" spc="-300" baseline="0" dirty="0" smtClean="0">
+                <a:solidFill>
+                  <a:schemeClr val="accent3">
+                    <a:lumMod val="50000"/>
+                  </a:schemeClr>
+                </a:solidFill>
+                <a:latin typeface="Times New Roman"/>
+                <a:cs typeface="Times New Roman"/>
+              </a:rPr>
+              <a:t>Festival e-Voting System</a:t>
             </a:r>
             <a:endParaRPr lang="en-US" sz="13800" b="0" spc="-300" baseline="0" dirty="0">
               <a:solidFill>
@@ -1528,7 +1552,15 @@
                   <a:schemeClr val="bg1"/>
                 </a:solidFill>
               </a:rPr>
-              <a:t>DEVELOPMENT APPROACHES</a:t>
+              <a:t>DEVELOPMENT </a:t>
+            </a:r>
+            <a:r>
+              <a:rPr lang="en-US" sz="3700" b="1" spc="1200" dirty="0" smtClean="0">
+                <a:solidFill>
+                  <a:schemeClr val="bg1"/>
+                </a:solidFill>
+              </a:rPr>
+              <a:t>STORY</a:t>
             </a:r>
             <a:endParaRPr lang="en-US" sz="3700" b="1" spc="1200" dirty="0">
               <a:solidFill>
@@ -1987,16 +2019,28 @@
                 <a:cs typeface="Libre Baskerville"/>
                 <a:sym typeface="Libre Baskerville"/>
               </a:rPr>
-              <a:t>Next year 5,000 </a:t>
+              <a:t>N</a:t>
+            </a:r>
+            <a:r>
+              <a:rPr lang="en-US" sz="4000" dirty="0" smtClean="0">
+                <a:solidFill>
+                  <a:schemeClr val="dk1"/>
+                </a:solidFill>
+                <a:latin typeface="Times New Roman" panose="02020603050405020304" pitchFamily="18" charset="0"/>
+                <a:ea typeface="Libre Baskerville"/>
+                <a:cs typeface="Times New Roman" panose="02020603050405020304" pitchFamily="18" charset="0"/>
+                <a:sym typeface="Libre Baskerville"/>
+              </a:rPr>
+              <a:t>ext year 5,000 </a:t>
             </a:r>
             <a:r>
               <a:rPr lang="en-US" sz="4000" dirty="0">
                 <a:solidFill>
                   <a:schemeClr val="dk1"/>
                 </a:solidFill>
-                <a:latin typeface="Libre Baskerville"/>
+                <a:latin typeface="Times New Roman" panose="02020603050405020304" pitchFamily="18" charset="0"/>
                 <a:ea typeface="Libre Baskerville"/>
-                <a:cs typeface="Libre Baskerville"/>
+                <a:cs typeface="Times New Roman" panose="02020603050405020304" pitchFamily="18" charset="0"/>
                 <a:sym typeface="Libre Baskerville"/>
               </a:rPr>
               <a:t>attendees are expected to benefit from participating in the World Arts Film Festival </a:t>
@@ -2006,9 +2050,9 @@
                 <a:solidFill>
                   <a:schemeClr val="dk1"/>
                 </a:solidFill>
-                <a:latin typeface="Libre Baskerville"/>
+                <a:latin typeface="Times New Roman" panose="02020603050405020304" pitchFamily="18" charset="0"/>
                 <a:ea typeface="Libre Baskerville"/>
-                <a:cs typeface="Libre Baskerville"/>
+                <a:cs typeface="Times New Roman" panose="02020603050405020304" pitchFamily="18" charset="0"/>
                 <a:sym typeface="Libre Baskerville"/>
               </a:rPr>
               <a:t>including </a:t>
@@ -2018,9 +2062,9 @@
                 <a:solidFill>
                   <a:schemeClr val="dk1"/>
                 </a:solidFill>
-                <a:latin typeface="Libre Baskerville"/>
+                <a:latin typeface="Times New Roman" panose="02020603050405020304" pitchFamily="18" charset="0"/>
                 <a:ea typeface="Libre Baskerville"/>
-                <a:cs typeface="Libre Baskerville"/>
+                <a:cs typeface="Times New Roman" panose="02020603050405020304" pitchFamily="18" charset="0"/>
                 <a:sym typeface="Libre Baskerville"/>
               </a:rPr>
               <a:t>college-aged students, local and visiting filmmakers from over 30+ countries, men and women </a:t>
@@ -2030,9 +2074,9 @@
                 <a:solidFill>
                   <a:schemeClr val="dk1"/>
                 </a:solidFill>
-                <a:latin typeface="Libre Baskerville"/>
+                <a:latin typeface="Times New Roman" panose="02020603050405020304" pitchFamily="18" charset="0"/>
                 <a:ea typeface="Libre Baskerville"/>
-                <a:cs typeface="Libre Baskerville"/>
+                <a:cs typeface="Times New Roman" panose="02020603050405020304" pitchFamily="18" charset="0"/>
                 <a:sym typeface="Libre Baskerville"/>
               </a:rPr>
               <a:t>from </a:t>
@@ -2042,9 +2086,9 @@
                 <a:solidFill>
                   <a:schemeClr val="dk1"/>
                 </a:solidFill>
-                <a:latin typeface="Libre Baskerville"/>
+                <a:latin typeface="Times New Roman" panose="02020603050405020304" pitchFamily="18" charset="0"/>
                 <a:ea typeface="Libre Baskerville"/>
-                <a:cs typeface="Libre Baskerville"/>
+                <a:cs typeface="Times New Roman" panose="02020603050405020304" pitchFamily="18" charset="0"/>
                 <a:sym typeface="Libre Baskerville"/>
               </a:rPr>
               <a:t>Jacksonville area, New York and California, groups, families and </a:t>
@@ -2054,9 +2098,9 @@
                 <a:solidFill>
                   <a:schemeClr val="dk1"/>
                 </a:solidFill>
-                <a:latin typeface="Libre Baskerville"/>
+                <a:latin typeface="Times New Roman" panose="02020603050405020304" pitchFamily="18" charset="0"/>
                 <a:ea typeface="Libre Baskerville"/>
-                <a:cs typeface="Libre Baskerville"/>
+                <a:cs typeface="Times New Roman" panose="02020603050405020304" pitchFamily="18" charset="0"/>
                 <a:sym typeface="Libre Baskerville"/>
               </a:rPr>
               <a:t>individuals </a:t>
@@ -2066,9 +2110,9 @@
                 <a:solidFill>
                   <a:schemeClr val="dk1"/>
                 </a:solidFill>
-                <a:latin typeface="Libre Baskerville"/>
+                <a:latin typeface="Times New Roman" panose="02020603050405020304" pitchFamily="18" charset="0"/>
                 <a:ea typeface="Libre Baskerville"/>
-                <a:cs typeface="Libre Baskerville"/>
+                <a:cs typeface="Times New Roman" panose="02020603050405020304" pitchFamily="18" charset="0"/>
                 <a:sym typeface="Libre Baskerville"/>
               </a:rPr>
               <a:t>including those with special needs interested in the unique film festival experience.</a:t>
@@ -2595,212 +2639,19 @@
           <a:lstStyle/>
           <a:p>
             <a:r>
-              <a:rPr lang="en-US" sz="4000" dirty="0" smtClean="0"/>
+              <a:rPr lang="en-US" sz="4000" dirty="0" smtClean="0">
+                <a:latin typeface="Times New Roman" panose="02020603050405020304" pitchFamily="18" charset="0"/>
+                <a:cs typeface="Times New Roman" panose="02020603050405020304" pitchFamily="18" charset="0"/>
+              </a:rPr>
               <a:t>In our e-Voting System we have accumulated roughly  40 different use r stories so far. All of these user stories revolves around 3 actors; Voter, Admin, Mobile Voter.  Below is a snippet of just a couple of the user stories we came up with.</a:t>
             </a:r>
-            <a:endParaRPr lang="en-US" sz="4000" dirty="0"/>
+            <a:endParaRPr lang="en-US" sz="4000" dirty="0">
+              <a:latin typeface="Times New Roman" panose="02020603050405020304" pitchFamily="18" charset="0"/>
+              <a:cs typeface="Times New Roman" panose="02020603050405020304" pitchFamily="18" charset="0"/>
+            </a:endParaRPr>
           </a:p>
         </p:txBody>
       </p:sp>
-      <p:pic>
-        <p:nvPicPr>
-          <p:cNvPr id="19" name="Picture 4" descr="Voter Diagram"/>
-          <p:cNvPicPr>
-            <a:picLocks noChangeAspect="1" noChangeArrowheads="1"/>
-          </p:cNvPicPr>
-          <p:nvPr/>
-        </p:nvPicPr>
-        <p:blipFill>
-          <a:blip r:embed="rId18">
-            <a:extLst>
-              <a:ext uri="{28A0092B-C50C-407E-A947-70E740481C1C}">
-                <a14:useLocalDpi xmlns:a14="http://schemas.microsoft.com/office/drawing/2010/main" val="0"/>
-              </a:ext>
-            </a:extLst>
-          </a:blip>
-          <a:srcRect/>
-          <a:stretch>
-            <a:fillRect/>
-          </a:stretch>
-        </p:blipFill>
-        <p:spPr bwMode="auto">
-          <a:xfrm>
-            <a:off x="11640952" y="7897865"/>
-            <a:ext cx="3181350" cy="2219325"/>
-          </a:xfrm>
-          <a:prstGeom prst="rect">
-            <a:avLst/>
-          </a:prstGeom>
-          <a:noFill/>
-          <a:ln>
-            <a:noFill/>
-          </a:ln>
-          <a:extLst>
-            <a:ext uri="{909E8E84-426E-40DD-AFC4-6F175D3DCCD1}">
-              <a14:hiddenFill xmlns:a14="http://schemas.microsoft.com/office/drawing/2010/main">
-                <a:solidFill>
-                  <a:srgbClr val="FFFFFF"/>
-                </a:solidFill>
-              </a14:hiddenFill>
-            </a:ext>
-            <a:ext uri="{91240B29-F687-4F45-9708-019B960494DF}">
-              <a14:hiddenLine xmlns:a14="http://schemas.microsoft.com/office/drawing/2010/main" w="9525">
-                <a:solidFill>
-                  <a:srgbClr val="000000"/>
-                </a:solidFill>
-                <a:miter lim="800000"/>
-                <a:headEnd/>
-                <a:tailEnd/>
-              </a14:hiddenLine>
-            </a:ext>
-          </a:extLst>
-        </p:spPr>
-      </p:pic>
-      <p:graphicFrame>
-        <p:nvGraphicFramePr>
-          <p:cNvPr id="20" name="Object 19"/>
-          <p:cNvGraphicFramePr>
-            <a:graphicFrameLocks noChangeAspect="1"/>
-          </p:cNvGraphicFramePr>
-          <p:nvPr>
-            <p:extLst>
-              <p:ext uri="{D42A27DB-BD31-4B8C-83A1-F6EECF244321}">
-                <p14:modId xmlns:p14="http://schemas.microsoft.com/office/powerpoint/2010/main" val="3701045237"/>
-              </p:ext>
-            </p:extLst>
-          </p:nvPr>
-        </p:nvGraphicFramePr>
-        <p:xfrm>
-          <a:off x="14374430" y="5809079"/>
-          <a:ext cx="5937250" cy="1992313"/>
-        </p:xfrm>
-        <a:graphic>
-          <a:graphicData uri="http://schemas.openxmlformats.org/presentationml/2006/ole">
-            <mc:AlternateContent xmlns:mc="http://schemas.openxmlformats.org/markup-compatibility/2006">
-              <mc:Choice xmlns:v="urn:schemas-microsoft-com:vml" Requires="v">
-                <p:oleObj spid="_x0000_s1037" name="Visio" r:id="rId19" imgW="7181852" imgH="2409868" progId="Visio.Drawing.15">
-                  <p:embed/>
-                </p:oleObj>
-              </mc:Choice>
-              <mc:Fallback>
-                <p:oleObj name="Visio" r:id="rId19" imgW="7181852" imgH="2409868" progId="Visio.Drawing.15">
-                  <p:embed/>
-                  <p:pic>
-                    <p:nvPicPr>
-                      <p:cNvPr id="0" name="Object 5"/>
-                      <p:cNvPicPr>
-                        <a:picLocks noChangeAspect="1" noChangeArrowheads="1"/>
-                      </p:cNvPicPr>
-                      <p:nvPr/>
-                    </p:nvPicPr>
-                    <p:blipFill>
-                      <a:blip r:embed="rId20">
-                        <a:extLst>
-                          <a:ext uri="{28A0092B-C50C-407E-A947-70E740481C1C}">
-                            <a14:useLocalDpi xmlns:a14="http://schemas.microsoft.com/office/drawing/2010/main" val="0"/>
-                          </a:ext>
-                        </a:extLst>
-                      </a:blip>
-                      <a:srcRect/>
-                      <a:stretch>
-                        <a:fillRect/>
-                      </a:stretch>
-                    </p:blipFill>
-                    <p:spPr bwMode="auto">
-                      <a:xfrm>
-                        <a:off x="14374430" y="5809079"/>
-                        <a:ext cx="5937250" cy="1992313"/>
-                      </a:xfrm>
-                      <a:prstGeom prst="rect">
-                        <a:avLst/>
-                      </a:prstGeom>
-                      <a:noFill/>
-                      <a:ln>
-                        <a:noFill/>
-                      </a:ln>
-                      <a:extLst>
-                        <a:ext uri="{909E8E84-426E-40DD-AFC4-6F175D3DCCD1}">
-                          <a14:hiddenFill xmlns:a14="http://schemas.microsoft.com/office/drawing/2010/main">
-                            <a:solidFill>
-                              <a:srgbClr val="FFFFFF"/>
-                            </a:solidFill>
-                          </a14:hiddenFill>
-                        </a:ext>
-                        <a:ext uri="{91240B29-F687-4F45-9708-019B960494DF}">
-                          <a14:hiddenLine xmlns:a14="http://schemas.microsoft.com/office/drawing/2010/main" w="9525">
-                            <a:solidFill>
-                              <a:srgbClr val="000000"/>
-                            </a:solidFill>
-                            <a:miter lim="800000"/>
-                            <a:headEnd/>
-                            <a:tailEnd/>
-                          </a14:hiddenLine>
-                        </a:ext>
-                      </a:extLst>
-                    </p:spPr>
-                  </p:pic>
-                </p:oleObj>
-              </mc:Fallback>
-            </mc:AlternateContent>
-          </a:graphicData>
-        </a:graphic>
-      </p:graphicFrame>
-      <p:pic>
-        <p:nvPicPr>
-          <p:cNvPr id="32" name="image01.png"/>
-          <p:cNvPicPr/>
-          <p:nvPr/>
-        </p:nvPicPr>
-        <p:blipFill>
-          <a:blip r:embed="rId21"/>
-          <a:srcRect/>
-          <a:stretch>
-            <a:fillRect/>
-          </a:stretch>
-        </p:blipFill>
-        <p:spPr>
-          <a:xfrm>
-            <a:off x="14822302" y="10126684"/>
-            <a:ext cx="2286000" cy="1981200"/>
-          </a:xfrm>
-          <a:prstGeom prst="rect">
-            <a:avLst/>
-          </a:prstGeom>
-          <a:ln/>
-        </p:spPr>
-      </p:pic>
-      <p:pic>
-        <p:nvPicPr>
-          <p:cNvPr id="33" name="Picture 1"/>
-          <p:cNvPicPr>
-            <a:picLocks noChangeAspect="1" noChangeArrowheads="1"/>
-          </p:cNvPicPr>
-          <p:nvPr/>
-        </p:nvPicPr>
-        <p:blipFill>
-          <a:blip r:embed="rId22"/>
-          <a:srcRect/>
-          <a:stretch>
-            <a:fillRect/>
-          </a:stretch>
-        </p:blipFill>
-        <p:spPr bwMode="auto">
-          <a:xfrm>
-            <a:off x="17248548" y="7893370"/>
-            <a:ext cx="3039856" cy="1914525"/>
-          </a:xfrm>
-          <a:prstGeom prst="rect">
-            <a:avLst/>
-          </a:prstGeom>
-          <a:noFill/>
-          <a:ln w="9525">
-            <a:noFill/>
-            <a:miter lim="800000"/>
-            <a:headEnd/>
-            <a:tailEnd/>
-          </a:ln>
-        </p:spPr>
-      </p:pic>
       <p:pic>
         <p:nvPicPr>
           <p:cNvPr id="28" name="Picture 27"/>
@@ -2810,14 +2661,14 @@
           <p:nvPr/>
         </p:nvPicPr>
         <p:blipFill>
-          <a:blip r:embed="rId23"/>
+          <a:blip r:embed="rId18"/>
           <a:stretch>
             <a:fillRect/>
           </a:stretch>
         </p:blipFill>
         <p:spPr>
           <a:xfrm>
-            <a:off x="11516573" y="16932863"/>
+            <a:off x="22788016" y="16058020"/>
             <a:ext cx="8771831" cy="5663518"/>
           </a:xfrm>
           <a:prstGeom prst="rect">
@@ -2825,6 +2676,100 @@
           </a:prstGeom>
         </p:spPr>
       </p:pic>
+      <p:sp>
+        <p:nvSpPr>
+          <p:cNvPr id="18" name="TextBox 17"/>
+          <p:cNvSpPr txBox="1"/>
+          <p:nvPr/>
+        </p:nvSpPr>
+        <p:spPr>
+          <a:xfrm>
+            <a:off x="33181959" y="5971378"/>
+            <a:ext cx="10201274" cy="5632311"/>
+          </a:xfrm>
+          <a:prstGeom prst="rect">
+            <a:avLst/>
+          </a:prstGeom>
+          <a:noFill/>
+        </p:spPr>
+        <p:txBody>
+          <a:bodyPr wrap="square" rtlCol="0">
+            <a:spAutoFit/>
+          </a:bodyPr>
+          <a:lstStyle/>
+          <a:p>
+            <a:r>
+              <a:rPr lang="en-US" sz="4000" dirty="0" smtClean="0">
+                <a:latin typeface="Times New Roman" panose="02020603050405020304" pitchFamily="18" charset="0"/>
+                <a:cs typeface="Times New Roman" panose="02020603050405020304" pitchFamily="18" charset="0"/>
+              </a:rPr>
+              <a:t>Our e-Voting system will allow visitors to vote on films and give feedback from a kiosk or from their mobile phone</a:t>
+            </a:r>
+            <a:r>
+              <a:rPr lang="en-US" sz="4000" dirty="0">
+                <a:latin typeface="Times New Roman" panose="02020603050405020304" pitchFamily="18" charset="0"/>
+                <a:cs typeface="Times New Roman" panose="02020603050405020304" pitchFamily="18" charset="0"/>
+              </a:rPr>
+              <a:t>.</a:t>
+            </a:r>
+            <a:endParaRPr lang="en-US" sz="4000" dirty="0" smtClean="0">
+              <a:latin typeface="Times New Roman" panose="02020603050405020304" pitchFamily="18" charset="0"/>
+              <a:cs typeface="Times New Roman" panose="02020603050405020304" pitchFamily="18" charset="0"/>
+            </a:endParaRPr>
+          </a:p>
+          <a:p>
+            <a:endParaRPr lang="en-US" sz="4000" dirty="0">
+              <a:latin typeface="Times New Roman" panose="02020603050405020304" pitchFamily="18" charset="0"/>
+              <a:cs typeface="Times New Roman" panose="02020603050405020304" pitchFamily="18" charset="0"/>
+            </a:endParaRPr>
+          </a:p>
+          <a:p>
+            <a:r>
+              <a:rPr lang="en-US" sz="4000" dirty="0" smtClean="0">
+                <a:latin typeface="Times New Roman" panose="02020603050405020304" pitchFamily="18" charset="0"/>
+                <a:cs typeface="Times New Roman" panose="02020603050405020304" pitchFamily="18" charset="0"/>
+              </a:rPr>
+              <a:t>Our client would like to recognize the filmmakers for their hard work because they currently don’t have any system in place to recognize the collaborative efforts of the production crew.  </a:t>
+            </a:r>
+          </a:p>
+        </p:txBody>
+      </p:sp>
+      <p:sp>
+        <p:nvSpPr>
+          <p:cNvPr id="21" name="TextBox 20"/>
+          <p:cNvSpPr txBox="1"/>
+          <p:nvPr/>
+        </p:nvSpPr>
+        <p:spPr>
+          <a:xfrm>
+            <a:off x="33181959" y="22955857"/>
+            <a:ext cx="10201274" cy="3170099"/>
+          </a:xfrm>
+          <a:prstGeom prst="rect">
+            <a:avLst/>
+          </a:prstGeom>
+          <a:noFill/>
+        </p:spPr>
+        <p:txBody>
+          <a:bodyPr wrap="square" rtlCol="0">
+            <a:spAutoFit/>
+          </a:bodyPr>
+          <a:lstStyle/>
+          <a:p>
+            <a:r>
+              <a:rPr lang="en-US" sz="4000" dirty="0">
+                <a:latin typeface="Times New Roman" panose="02020603050405020304" pitchFamily="18" charset="0"/>
+                <a:cs typeface="Times New Roman" panose="02020603050405020304" pitchFamily="18" charset="0"/>
+              </a:rPr>
+              <a:t>With our system the client will be able to provide real-time feedback, with a voting leaderboard and allow greater functionality for planning future film festival events within a simple software package.</a:t>
+            </a:r>
+            <a:endParaRPr lang="en-US" sz="4000" dirty="0">
+              <a:latin typeface="Times New Roman" panose="02020603050405020304" pitchFamily="18" charset="0"/>
+              <a:cs typeface="Times New Roman" panose="02020603050405020304" pitchFamily="18" charset="0"/>
+            </a:endParaRPr>
+          </a:p>
+        </p:txBody>
+      </p:sp>
     </p:spTree>
   </p:cSld>
   <p:clrMapOvr>

</xml_diff>